<commit_message>
Modificacion de fechas para el 2016
</commit_message>
<xml_diff>
--- a/Presentaciones/00. Introduccion.pptx
+++ b/Presentaciones/00. Introduccion.pptx
@@ -289,7 +289,7 @@
           <a:p>
             <a:fld id="{39E7DDAA-043E-4D0E-B6E7-98C6C27521CB}" type="datetimeFigureOut">
               <a:rPr lang="es-AR" smtClean="0"/>
-              <a:t>10/08/14</a:t>
+              <a:t>17/8/16</a:t>
             </a:fld>
             <a:endParaRPr lang="es-AR"/>
           </a:p>
@@ -454,7 +454,7 @@
           <a:p>
             <a:fld id="{39E7DDAA-043E-4D0E-B6E7-98C6C27521CB}" type="datetimeFigureOut">
               <a:rPr lang="es-AR" smtClean="0"/>
-              <a:t>10/08/14</a:t>
+              <a:t>17/8/16</a:t>
             </a:fld>
             <a:endParaRPr lang="es-AR"/>
           </a:p>
@@ -629,7 +629,7 @@
           <a:p>
             <a:fld id="{39E7DDAA-043E-4D0E-B6E7-98C6C27521CB}" type="datetimeFigureOut">
               <a:rPr lang="es-AR" smtClean="0"/>
-              <a:t>10/08/14</a:t>
+              <a:t>17/8/16</a:t>
             </a:fld>
             <a:endParaRPr lang="es-AR"/>
           </a:p>
@@ -794,7 +794,7 @@
           <a:p>
             <a:fld id="{39E7DDAA-043E-4D0E-B6E7-98C6C27521CB}" type="datetimeFigureOut">
               <a:rPr lang="es-AR" smtClean="0"/>
-              <a:t>10/08/14</a:t>
+              <a:t>17/8/16</a:t>
             </a:fld>
             <a:endParaRPr lang="es-AR"/>
           </a:p>
@@ -1036,7 +1036,7 @@
           <a:p>
             <a:fld id="{39E7DDAA-043E-4D0E-B6E7-98C6C27521CB}" type="datetimeFigureOut">
               <a:rPr lang="es-AR" smtClean="0"/>
-              <a:t>10/08/14</a:t>
+              <a:t>17/8/16</a:t>
             </a:fld>
             <a:endParaRPr lang="es-AR"/>
           </a:p>
@@ -1300,7 +1300,7 @@
           <a:p>
             <a:fld id="{39E7DDAA-043E-4D0E-B6E7-98C6C27521CB}" type="datetimeFigureOut">
               <a:rPr lang="es-AR" smtClean="0"/>
-              <a:t>10/08/14</a:t>
+              <a:t>17/8/16</a:t>
             </a:fld>
             <a:endParaRPr lang="es-AR"/>
           </a:p>
@@ -1678,7 +1678,7 @@
           <a:p>
             <a:fld id="{39E7DDAA-043E-4D0E-B6E7-98C6C27521CB}" type="datetimeFigureOut">
               <a:rPr lang="es-AR" smtClean="0"/>
-              <a:t>10/08/14</a:t>
+              <a:t>17/8/16</a:t>
             </a:fld>
             <a:endParaRPr lang="es-AR"/>
           </a:p>
@@ -1828,7 +1828,7 @@
           <a:p>
             <a:fld id="{39E7DDAA-043E-4D0E-B6E7-98C6C27521CB}" type="datetimeFigureOut">
               <a:rPr lang="es-AR" smtClean="0"/>
-              <a:t>10/08/14</a:t>
+              <a:t>17/8/16</a:t>
             </a:fld>
             <a:endParaRPr lang="es-AR"/>
           </a:p>
@@ -1918,7 +1918,7 @@
           <a:p>
             <a:fld id="{39E7DDAA-043E-4D0E-B6E7-98C6C27521CB}" type="datetimeFigureOut">
               <a:rPr lang="es-AR" smtClean="0"/>
-              <a:t>10/08/14</a:t>
+              <a:t>17/8/16</a:t>
             </a:fld>
             <a:endParaRPr lang="es-AR"/>
           </a:p>
@@ -2179,7 +2179,7 @@
           <a:p>
             <a:fld id="{39E7DDAA-043E-4D0E-B6E7-98C6C27521CB}" type="datetimeFigureOut">
               <a:rPr lang="es-AR" smtClean="0"/>
-              <a:t>10/08/14</a:t>
+              <a:t>17/8/16</a:t>
             </a:fld>
             <a:endParaRPr lang="es-AR"/>
           </a:p>
@@ -2467,7 +2467,7 @@
           <a:p>
             <a:fld id="{39E7DDAA-043E-4D0E-B6E7-98C6C27521CB}" type="datetimeFigureOut">
               <a:rPr lang="es-AR" smtClean="0"/>
-              <a:t>10/08/14</a:t>
+              <a:t>17/8/16</a:t>
             </a:fld>
             <a:endParaRPr lang="es-AR"/>
           </a:p>
@@ -3238,7 +3238,7 @@
           <a:p>
             <a:fld id="{39E7DDAA-043E-4D0E-B6E7-98C6C27521CB}" type="datetimeFigureOut">
               <a:rPr lang="es-AR" smtClean="0"/>
-              <a:t>10/08/14</a:t>
+              <a:t>17/8/16</a:t>
             </a:fld>
             <a:endParaRPr lang="es-AR"/>
           </a:p>
@@ -3912,6 +3912,13 @@
   <p:clrMapOvr>
     <a:masterClrMapping/>
   </p:clrMapOvr>
+  <p:timing>
+    <p:tnLst>
+      <p:par>
+        <p:cTn xmlns:p14="http://schemas.microsoft.com/office/powerpoint/2010/main" id="1" dur="indefinite" restart="never" nodeType="tmRoot"/>
+      </p:par>
+    </p:tnLst>
+  </p:timing>
 </p:sld>
 </file>
 
@@ -3965,14 +3972,14 @@
             <p:ph idx="1"/>
             <p:extLst>
               <p:ext uri="{D42A27DB-BD31-4B8C-83A1-F6EECF244321}">
-                <p14:modId xmlns:p14="http://schemas.microsoft.com/office/powerpoint/2010/main" val="773135810"/>
+                <p14:modId xmlns:p14="http://schemas.microsoft.com/office/powerpoint/2010/main" val="199068466"/>
               </p:ext>
             </p:extLst>
           </p:nvPr>
         </p:nvGraphicFramePr>
         <p:xfrm>
           <a:off x="467544" y="2060848"/>
-          <a:ext cx="8229600" cy="4287519"/>
+          <a:ext cx="8229600" cy="4074159"/>
         </p:xfrm>
         <a:graphic>
           <a:graphicData uri="http://schemas.openxmlformats.org/drawingml/2006/table">
@@ -4056,7 +4063,7 @@
                     <a:p>
                       <a:r>
                         <a:rPr lang="es-ES" sz="1400" dirty="0" smtClean="0"/>
-                        <a:t>14-</a:t>
+                        <a:t>18-</a:t>
                       </a:r>
                       <a:r>
                         <a:rPr lang="es-ES" sz="1400" dirty="0" smtClean="0"/>
@@ -4088,7 +4095,7 @@
                     <a:p>
                       <a:r>
                         <a:rPr lang="es-ES" sz="1400" dirty="0" smtClean="0"/>
-                        <a:t>21-</a:t>
+                        <a:t>25-</a:t>
                       </a:r>
                       <a:r>
                         <a:rPr lang="es-ES" sz="1400" dirty="0" smtClean="0"/>
@@ -4126,7 +4133,7 @@
                     <a:p>
                       <a:r>
                         <a:rPr lang="es-ES" sz="1400" dirty="0" smtClean="0"/>
-                        <a:t>28-</a:t>
+                        <a:t>31-</a:t>
                       </a:r>
                       <a:r>
                         <a:rPr lang="es-ES" sz="1400" dirty="0" smtClean="0"/>
@@ -4158,7 +4165,7 @@
                     <a:p>
                       <a:r>
                         <a:rPr lang="es-ES" sz="1400" dirty="0" smtClean="0"/>
-                        <a:t>04-</a:t>
+                        <a:t>01-</a:t>
                       </a:r>
                       <a:r>
                         <a:rPr lang="es-ES" sz="1400" dirty="0" smtClean="0"/>
@@ -4208,7 +4215,7 @@
                     <a:p>
                       <a:r>
                         <a:rPr lang="es-ES" sz="1400" dirty="0" smtClean="0"/>
-                        <a:t>11-</a:t>
+                        <a:t>08-</a:t>
                       </a:r>
                       <a:r>
                         <a:rPr lang="es-ES" sz="1400" dirty="0" smtClean="0"/>
@@ -4264,7 +4271,7 @@
                     <a:p>
                       <a:r>
                         <a:rPr lang="es-ES" sz="1400" dirty="0" smtClean="0"/>
-                        <a:t>18-</a:t>
+                        <a:t>15-</a:t>
                       </a:r>
                       <a:r>
                         <a:rPr lang="es-ES" sz="1400" dirty="0" smtClean="0"/>
@@ -4306,7 +4313,7 @@
                     <a:p>
                       <a:r>
                         <a:rPr lang="es-ES" sz="1400" dirty="0" smtClean="0"/>
-                        <a:t>25-</a:t>
+                        <a:t>22-</a:t>
                       </a:r>
                       <a:r>
                         <a:rPr lang="es-ES" sz="1400" dirty="0" smtClean="0"/>
@@ -4326,7 +4333,6 @@
                         <a:rPr lang="es-ES" sz="1400" dirty="0" smtClean="0"/>
                         <a:t>Parcial 1</a:t>
                       </a:r>
-                      <a:endParaRPr lang="es-ES" sz="1400" dirty="0" smtClean="0"/>
                     </a:p>
                   </a:txBody>
                   <a:tcPr/>
@@ -4338,7 +4344,7 @@
                     <a:p>
                       <a:r>
                         <a:rPr lang="es-ES" sz="1400" dirty="0" smtClean="0"/>
-                        <a:t>02-</a:t>
+                        <a:t>29-</a:t>
                       </a:r>
                       <a:r>
                         <a:rPr lang="es-ES" sz="1400" dirty="0" smtClean="0"/>
@@ -4396,7 +4402,7 @@
                     <a:p>
                       <a:r>
                         <a:rPr lang="es-ES" sz="1400" dirty="0" smtClean="0"/>
-                        <a:t>09-</a:t>
+                        <a:t>06-</a:t>
                       </a:r>
                       <a:r>
                         <a:rPr lang="es-ES" sz="1400" dirty="0" smtClean="0"/>
@@ -4444,7 +4450,7 @@
                     <a:p>
                       <a:r>
                         <a:rPr lang="es-ES" sz="1400" dirty="0" smtClean="0"/>
-                        <a:t>16-</a:t>
+                        <a:t>13-</a:t>
                       </a:r>
                       <a:r>
                         <a:rPr lang="es-ES" sz="1400" dirty="0" smtClean="0"/>
@@ -4507,7 +4513,7 @@
                     <a:p>
                       <a:r>
                         <a:rPr lang="es-ES" sz="1400" dirty="0" smtClean="0"/>
-                        <a:t>23-</a:t>
+                        <a:t>20-</a:t>
                       </a:r>
                       <a:r>
                         <a:rPr lang="es-ES" sz="1400" dirty="0" smtClean="0"/>
@@ -4559,7 +4565,11 @@
                     <a:p>
                       <a:r>
                         <a:rPr lang="es-ES" sz="1400" dirty="0" smtClean="0"/>
-                        <a:t>31-10</a:t>
+                        <a:t>27-</a:t>
+                      </a:r>
+                      <a:r>
+                        <a:rPr lang="es-ES" sz="1400" dirty="0" smtClean="0"/>
+                        <a:t>10</a:t>
                       </a:r>
                       <a:endParaRPr lang="es-ES" sz="1400" dirty="0"/>
                     </a:p>
@@ -4573,11 +4583,7 @@
                     <a:p>
                       <a:r>
                         <a:rPr lang="es-AR" sz="1400" dirty="0" smtClean="0"/>
-                        <a:t>09.</a:t>
-                      </a:r>
-                      <a:r>
-                        <a:rPr lang="es-AR" sz="1400" dirty="0" smtClean="0"/>
-                        <a:t>La medición de los atributos externos del producto: la calidad</a:t>
+                        <a:t>La medición del costo y esfuerzo</a:t>
                       </a:r>
                       <a:endParaRPr lang="es-ES" sz="1400" dirty="0"/>
                     </a:p>
@@ -4592,8 +4598,22 @@
                     <a:lstStyle/>
                     <a:p>
                       <a:r>
-                        <a:rPr lang="es-ES" sz="1400" dirty="0" smtClean="0"/>
-                        <a:t>07-11</a:t>
+                        <a:rPr lang="es-ES" sz="1600" dirty="0" smtClean="0"/>
+                        <a:t>03-11</a:t>
+                      </a:r>
+                      <a:endParaRPr lang="es-ES" sz="1600" dirty="0"/>
+                    </a:p>
+                  </a:txBody>
+                  <a:tcPr/>
+                </a:tc>
+                <a:tc>
+                  <a:txBody>
+                    <a:bodyPr/>
+                    <a:lstStyle/>
+                    <a:p>
+                      <a:r>
+                        <a:rPr lang="es-AR" sz="1400" dirty="0" smtClean="0"/>
+                        <a:t>09.La medición de los atributos externos del producto: la calidad</a:t>
                       </a:r>
                       <a:endParaRPr lang="es-ES" sz="1400" dirty="0"/>
                     </a:p>
@@ -4606,25 +4626,8 @@
                     <a:lstStyle/>
                     <a:p>
                       <a:r>
-                        <a:rPr lang="es-AR" sz="1400" dirty="0" smtClean="0"/>
-                        <a:t>10. Modelos y Métricas de Confiabilidad de Software</a:t>
-                      </a:r>
-                      <a:endParaRPr lang="es-ES" sz="1400" dirty="0" smtClean="0"/>
-                    </a:p>
-                    <a:p>
-                      <a:endParaRPr lang="es-ES" sz="1400" dirty="0"/>
-                    </a:p>
-                  </a:txBody>
-                  <a:tcPr/>
-                </a:tc>
-                <a:tc>
-                  <a:txBody>
-                    <a:bodyPr/>
-                    <a:lstStyle/>
-                    <a:p>
-                      <a:r>
                         <a:rPr lang="es-ES" sz="1400" dirty="0" smtClean="0"/>
-                        <a:t>14-11</a:t>
+                        <a:t>10-11</a:t>
                       </a:r>
                       <a:endParaRPr lang="es-ES" sz="1400" dirty="0"/>
                     </a:p>
@@ -4658,7 +4661,11 @@
                     <a:p>
                       <a:r>
                         <a:rPr lang="es-ES" sz="1400" dirty="0" smtClean="0"/>
-                        <a:t>21-11</a:t>
+                        <a:t>17-</a:t>
+                      </a:r>
+                      <a:r>
+                        <a:rPr lang="es-ES" sz="1400" dirty="0" smtClean="0"/>
+                        <a:t>11</a:t>
                       </a:r>
                       <a:endParaRPr lang="es-ES" sz="1400" dirty="0"/>
                     </a:p>
@@ -4714,6 +4721,13 @@
   <p:clrMapOvr>
     <a:masterClrMapping/>
   </p:clrMapOvr>
+  <p:timing>
+    <p:tnLst>
+      <p:par>
+        <p:cTn xmlns:p14="http://schemas.microsoft.com/office/powerpoint/2010/main" id="1" dur="indefinite" restart="never" nodeType="tmRoot"/>
+      </p:par>
+    </p:tnLst>
+  </p:timing>
 </p:sld>
 </file>
 
@@ -4914,6 +4928,13 @@
   <p:clrMapOvr>
     <a:masterClrMapping/>
   </p:clrMapOvr>
+  <p:timing>
+    <p:tnLst>
+      <p:par>
+        <p:cTn xmlns:p14="http://schemas.microsoft.com/office/powerpoint/2010/main" id="1" dur="indefinite" restart="never" nodeType="tmRoot"/>
+      </p:par>
+    </p:tnLst>
+  </p:timing>
 </p:sld>
 </file>
 
@@ -5058,6 +5079,13 @@
   <p:clrMapOvr>
     <a:masterClrMapping/>
   </p:clrMapOvr>
+  <p:timing>
+    <p:tnLst>
+      <p:par>
+        <p:cTn xmlns:p14="http://schemas.microsoft.com/office/powerpoint/2010/main" id="1" dur="indefinite" restart="never" nodeType="tmRoot"/>
+      </p:par>
+    </p:tnLst>
+  </p:timing>
 </p:sld>
 </file>
 
@@ -5308,6 +5336,13 @@
   <p:clrMapOvr>
     <a:masterClrMapping/>
   </p:clrMapOvr>
+  <p:timing>
+    <p:tnLst>
+      <p:par>
+        <p:cTn xmlns:p14="http://schemas.microsoft.com/office/powerpoint/2010/main" id="1" dur="indefinite" restart="never" nodeType="tmRoot"/>
+      </p:par>
+    </p:tnLst>
+  </p:timing>
 </p:sld>
 </file>
 
@@ -5567,6 +5602,13 @@
   <p:clrMapOvr>
     <a:masterClrMapping/>
   </p:clrMapOvr>
+  <p:timing>
+    <p:tnLst>
+      <p:par>
+        <p:cTn xmlns:p14="http://schemas.microsoft.com/office/powerpoint/2010/main" id="1" dur="indefinite" restart="never" nodeType="tmRoot"/>
+      </p:par>
+    </p:tnLst>
+  </p:timing>
 </p:sld>
 </file>
 
@@ -5813,6 +5855,13 @@
   <p:clrMapOvr>
     <a:masterClrMapping/>
   </p:clrMapOvr>
+  <p:timing>
+    <p:tnLst>
+      <p:par>
+        <p:cTn xmlns:p14="http://schemas.microsoft.com/office/powerpoint/2010/main" id="1" dur="indefinite" restart="never" nodeType="tmRoot"/>
+      </p:par>
+    </p:tnLst>
+  </p:timing>
 </p:sld>
 </file>
 
@@ -6097,6 +6146,13 @@
   <p:clrMapOvr>
     <a:masterClrMapping/>
   </p:clrMapOvr>
+  <p:timing>
+    <p:tnLst>
+      <p:par>
+        <p:cTn xmlns:p14="http://schemas.microsoft.com/office/powerpoint/2010/main" id="1" dur="indefinite" restart="never" nodeType="tmRoot"/>
+      </p:par>
+    </p:tnLst>
+  </p:timing>
 </p:sld>
 </file>
 
@@ -6323,6 +6379,13 @@
   <p:clrMapOvr>
     <a:masterClrMapping/>
   </p:clrMapOvr>
+  <p:timing>
+    <p:tnLst>
+      <p:par>
+        <p:cTn xmlns:p14="http://schemas.microsoft.com/office/powerpoint/2010/main" id="1" dur="indefinite" restart="never" nodeType="tmRoot"/>
+      </p:par>
+    </p:tnLst>
+  </p:timing>
 </p:sld>
 </file>
 
@@ -6506,6 +6569,13 @@
   <p:clrMapOvr>
     <a:masterClrMapping/>
   </p:clrMapOvr>
+  <p:timing>
+    <p:tnLst>
+      <p:par>
+        <p:cTn xmlns:p14="http://schemas.microsoft.com/office/powerpoint/2010/main" id="1" dur="indefinite" restart="never" nodeType="tmRoot"/>
+      </p:par>
+    </p:tnLst>
+  </p:timing>
 </p:sld>
 </file>
 

</xml_diff>

<commit_message>
Actualización del Contenido - Capitulo 10 no va
</commit_message>
<xml_diff>
--- a/Presentaciones/00. Introduccion.pptx
+++ b/Presentaciones/00. Introduccion.pptx
@@ -289,7 +289,7 @@
           <a:p>
             <a:fld id="{39E7DDAA-043E-4D0E-B6E7-98C6C27521CB}" type="datetimeFigureOut">
               <a:rPr lang="es-AR" smtClean="0"/>
-              <a:t>17/8/16</a:t>
+              <a:t>18/8/16</a:t>
             </a:fld>
             <a:endParaRPr lang="es-AR"/>
           </a:p>
@@ -454,7 +454,7 @@
           <a:p>
             <a:fld id="{39E7DDAA-043E-4D0E-B6E7-98C6C27521CB}" type="datetimeFigureOut">
               <a:rPr lang="es-AR" smtClean="0"/>
-              <a:t>17/8/16</a:t>
+              <a:t>18/8/16</a:t>
             </a:fld>
             <a:endParaRPr lang="es-AR"/>
           </a:p>
@@ -629,7 +629,7 @@
           <a:p>
             <a:fld id="{39E7DDAA-043E-4D0E-B6E7-98C6C27521CB}" type="datetimeFigureOut">
               <a:rPr lang="es-AR" smtClean="0"/>
-              <a:t>17/8/16</a:t>
+              <a:t>18/8/16</a:t>
             </a:fld>
             <a:endParaRPr lang="es-AR"/>
           </a:p>
@@ -794,7 +794,7 @@
           <a:p>
             <a:fld id="{39E7DDAA-043E-4D0E-B6E7-98C6C27521CB}" type="datetimeFigureOut">
               <a:rPr lang="es-AR" smtClean="0"/>
-              <a:t>17/8/16</a:t>
+              <a:t>18/8/16</a:t>
             </a:fld>
             <a:endParaRPr lang="es-AR"/>
           </a:p>
@@ -1036,7 +1036,7 @@
           <a:p>
             <a:fld id="{39E7DDAA-043E-4D0E-B6E7-98C6C27521CB}" type="datetimeFigureOut">
               <a:rPr lang="es-AR" smtClean="0"/>
-              <a:t>17/8/16</a:t>
+              <a:t>18/8/16</a:t>
             </a:fld>
             <a:endParaRPr lang="es-AR"/>
           </a:p>
@@ -1300,7 +1300,7 @@
           <a:p>
             <a:fld id="{39E7DDAA-043E-4D0E-B6E7-98C6C27521CB}" type="datetimeFigureOut">
               <a:rPr lang="es-AR" smtClean="0"/>
-              <a:t>17/8/16</a:t>
+              <a:t>18/8/16</a:t>
             </a:fld>
             <a:endParaRPr lang="es-AR"/>
           </a:p>
@@ -1678,7 +1678,7 @@
           <a:p>
             <a:fld id="{39E7DDAA-043E-4D0E-B6E7-98C6C27521CB}" type="datetimeFigureOut">
               <a:rPr lang="es-AR" smtClean="0"/>
-              <a:t>17/8/16</a:t>
+              <a:t>18/8/16</a:t>
             </a:fld>
             <a:endParaRPr lang="es-AR"/>
           </a:p>
@@ -1828,7 +1828,7 @@
           <a:p>
             <a:fld id="{39E7DDAA-043E-4D0E-B6E7-98C6C27521CB}" type="datetimeFigureOut">
               <a:rPr lang="es-AR" smtClean="0"/>
-              <a:t>17/8/16</a:t>
+              <a:t>18/8/16</a:t>
             </a:fld>
             <a:endParaRPr lang="es-AR"/>
           </a:p>
@@ -1918,7 +1918,7 @@
           <a:p>
             <a:fld id="{39E7DDAA-043E-4D0E-B6E7-98C6C27521CB}" type="datetimeFigureOut">
               <a:rPr lang="es-AR" smtClean="0"/>
-              <a:t>17/8/16</a:t>
+              <a:t>18/8/16</a:t>
             </a:fld>
             <a:endParaRPr lang="es-AR"/>
           </a:p>
@@ -2179,7 +2179,7 @@
           <a:p>
             <a:fld id="{39E7DDAA-043E-4D0E-B6E7-98C6C27521CB}" type="datetimeFigureOut">
               <a:rPr lang="es-AR" smtClean="0"/>
-              <a:t>17/8/16</a:t>
+              <a:t>18/8/16</a:t>
             </a:fld>
             <a:endParaRPr lang="es-AR"/>
           </a:p>
@@ -2467,7 +2467,7 @@
           <a:p>
             <a:fld id="{39E7DDAA-043E-4D0E-B6E7-98C6C27521CB}" type="datetimeFigureOut">
               <a:rPr lang="es-AR" smtClean="0"/>
-              <a:t>17/8/16</a:t>
+              <a:t>18/8/16</a:t>
             </a:fld>
             <a:endParaRPr lang="es-AR"/>
           </a:p>
@@ -3238,7 +3238,7 @@
           <a:p>
             <a:fld id="{39E7DDAA-043E-4D0E-B6E7-98C6C27521CB}" type="datetimeFigureOut">
               <a:rPr lang="es-AR" smtClean="0"/>
-              <a:t>17/8/16</a:t>
+              <a:t>18/8/16</a:t>
             </a:fld>
             <a:endParaRPr lang="es-AR"/>
           </a:p>
@@ -4063,11 +4063,7 @@
                     <a:p>
                       <a:r>
                         <a:rPr lang="es-ES" sz="1400" dirty="0" smtClean="0"/>
-                        <a:t>18-</a:t>
-                      </a:r>
-                      <a:r>
-                        <a:rPr lang="es-ES" sz="1400" dirty="0" smtClean="0"/>
-                        <a:t>08</a:t>
+                        <a:t>18-08</a:t>
                       </a:r>
                       <a:endParaRPr lang="es-ES" sz="1400" dirty="0"/>
                     </a:p>
@@ -4095,11 +4091,7 @@
                     <a:p>
                       <a:r>
                         <a:rPr lang="es-ES" sz="1400" dirty="0" smtClean="0"/>
-                        <a:t>25-</a:t>
-                      </a:r>
-                      <a:r>
-                        <a:rPr lang="es-ES" sz="1400" dirty="0" smtClean="0"/>
-                        <a:t>08</a:t>
+                        <a:t>25-08</a:t>
                       </a:r>
                       <a:endParaRPr lang="es-ES" sz="1400" dirty="0"/>
                     </a:p>
@@ -4133,11 +4125,7 @@
                     <a:p>
                       <a:r>
                         <a:rPr lang="es-ES" sz="1400" dirty="0" smtClean="0"/>
-                        <a:t>31-</a:t>
-                      </a:r>
-                      <a:r>
-                        <a:rPr lang="es-ES" sz="1400" dirty="0" smtClean="0"/>
-                        <a:t>08</a:t>
+                        <a:t>31-08</a:t>
                       </a:r>
                       <a:endParaRPr lang="es-ES" sz="1400" dirty="0"/>
                     </a:p>
@@ -4165,11 +4153,7 @@
                     <a:p>
                       <a:r>
                         <a:rPr lang="es-ES" sz="1400" dirty="0" smtClean="0"/>
-                        <a:t>01-</a:t>
-                      </a:r>
-                      <a:r>
-                        <a:rPr lang="es-ES" sz="1400" dirty="0" smtClean="0"/>
-                        <a:t>09</a:t>
+                        <a:t>01-09</a:t>
                       </a:r>
                       <a:endParaRPr lang="es-ES" sz="1400" dirty="0"/>
                     </a:p>
@@ -4215,11 +4199,7 @@
                     <a:p>
                       <a:r>
                         <a:rPr lang="es-ES" sz="1400" dirty="0" smtClean="0"/>
-                        <a:t>08-</a:t>
-                      </a:r>
-                      <a:r>
-                        <a:rPr lang="es-ES" sz="1400" dirty="0" smtClean="0"/>
-                        <a:t>09</a:t>
+                        <a:t>08-09</a:t>
                       </a:r>
                       <a:endParaRPr lang="es-ES" sz="1400" dirty="0"/>
                     </a:p>
@@ -4271,11 +4251,7 @@
                     <a:p>
                       <a:r>
                         <a:rPr lang="es-ES" sz="1400" dirty="0" smtClean="0"/>
-                        <a:t>15-</a:t>
-                      </a:r>
-                      <a:r>
-                        <a:rPr lang="es-ES" sz="1400" dirty="0" smtClean="0"/>
-                        <a:t>09</a:t>
+                        <a:t>15-09</a:t>
                       </a:r>
                       <a:endParaRPr lang="es-ES" sz="1400" dirty="0"/>
                     </a:p>
@@ -4313,11 +4289,7 @@
                     <a:p>
                       <a:r>
                         <a:rPr lang="es-ES" sz="1400" dirty="0" smtClean="0"/>
-                        <a:t>22-</a:t>
-                      </a:r>
-                      <a:r>
-                        <a:rPr lang="es-ES" sz="1400" dirty="0" smtClean="0"/>
-                        <a:t>09</a:t>
+                        <a:t>22-09</a:t>
                       </a:r>
                       <a:endParaRPr lang="es-ES" sz="1400" dirty="0"/>
                     </a:p>
@@ -4344,11 +4316,7 @@
                     <a:p>
                       <a:r>
                         <a:rPr lang="es-ES" sz="1400" dirty="0" smtClean="0"/>
-                        <a:t>29-</a:t>
-                      </a:r>
-                      <a:r>
-                        <a:rPr lang="es-ES" sz="1400" dirty="0" smtClean="0"/>
-                        <a:t>10</a:t>
+                        <a:t>29-10</a:t>
                       </a:r>
                       <a:endParaRPr lang="es-ES" sz="1400" dirty="0"/>
                     </a:p>
@@ -4402,11 +4370,7 @@
                     <a:p>
                       <a:r>
                         <a:rPr lang="es-ES" sz="1400" dirty="0" smtClean="0"/>
-                        <a:t>06-</a:t>
-                      </a:r>
-                      <a:r>
-                        <a:rPr lang="es-ES" sz="1400" dirty="0" smtClean="0"/>
-                        <a:t>10</a:t>
+                        <a:t>06-10</a:t>
                       </a:r>
                       <a:endParaRPr lang="es-ES" sz="1400" dirty="0"/>
                     </a:p>
@@ -4450,11 +4414,7 @@
                     <a:p>
                       <a:r>
                         <a:rPr lang="es-ES" sz="1400" dirty="0" smtClean="0"/>
-                        <a:t>13-</a:t>
-                      </a:r>
-                      <a:r>
-                        <a:rPr lang="es-ES" sz="1400" dirty="0" smtClean="0"/>
-                        <a:t>10</a:t>
+                        <a:t>13-10</a:t>
                       </a:r>
                       <a:endParaRPr lang="es-ES" sz="1400" dirty="0"/>
                     </a:p>
@@ -4513,11 +4473,7 @@
                     <a:p>
                       <a:r>
                         <a:rPr lang="es-ES" sz="1400" dirty="0" smtClean="0"/>
-                        <a:t>20-</a:t>
-                      </a:r>
-                      <a:r>
-                        <a:rPr lang="es-ES" sz="1400" dirty="0" smtClean="0"/>
-                        <a:t>10</a:t>
+                        <a:t>20-10</a:t>
                       </a:r>
                       <a:endParaRPr lang="es-ES" sz="1400" dirty="0"/>
                     </a:p>
@@ -4565,11 +4521,7 @@
                     <a:p>
                       <a:r>
                         <a:rPr lang="es-ES" sz="1400" dirty="0" smtClean="0"/>
-                        <a:t>27-</a:t>
-                      </a:r>
-                      <a:r>
-                        <a:rPr lang="es-ES" sz="1400" dirty="0" smtClean="0"/>
-                        <a:t>10</a:t>
+                        <a:t>27-10</a:t>
                       </a:r>
                       <a:endParaRPr lang="es-ES" sz="1400" dirty="0"/>
                     </a:p>
@@ -4661,11 +4613,7 @@
                     <a:p>
                       <a:r>
                         <a:rPr lang="es-ES" sz="1400" dirty="0" smtClean="0"/>
-                        <a:t>17-</a:t>
-                      </a:r>
-                      <a:r>
-                        <a:rPr lang="es-ES" sz="1400" dirty="0" smtClean="0"/>
-                        <a:t>11</a:t>
+                        <a:t>17-11</a:t>
                       </a:r>
                       <a:endParaRPr lang="es-ES" sz="1400" dirty="0"/>
                     </a:p>
@@ -6243,20 +6191,6 @@
             <a:endParaRPr lang="es-MX" dirty="0" smtClean="0"/>
           </a:p>
           <a:p>
-            <a:r>
-              <a:rPr lang="es-AR" dirty="0"/>
-              <a:t>Unidad </a:t>
-            </a:r>
-            <a:r>
-              <a:rPr lang="es-AR" dirty="0" smtClean="0"/>
-              <a:t>X </a:t>
-            </a:r>
-            <a:r>
-              <a:rPr lang="es-AR" dirty="0"/>
-              <a:t>– Modelos y Métricas de Confiabilidad de Software</a:t>
-            </a:r>
-          </a:p>
-          <a:p>
             <a:endParaRPr lang="es-MX" dirty="0"/>
           </a:p>
           <a:p>
@@ -6264,47 +6198,6 @@
           </a:p>
         </p:txBody>
       </p:sp>
-      <p:pic>
-        <p:nvPicPr>
-          <p:cNvPr id="6" name="Picture 5" descr="http://t2.gstatic.com/images?q=tbn:ANd9GcTUvLHdnFp0hdSP63Ob5-zcY9uTU0-XzYAVMhYHPgZJA31_VT4qmw"/>
-          <p:cNvPicPr>
-            <a:picLocks noChangeAspect="1" noChangeArrowheads="1"/>
-          </p:cNvPicPr>
-          <p:nvPr/>
-        </p:nvPicPr>
-        <p:blipFill>
-          <a:blip r:embed="rId2">
-            <a:extLst>
-              <a:ext uri="{28A0092B-C50C-407E-A947-70E740481C1C}">
-                <a14:useLocalDpi xmlns:a14="http://schemas.microsoft.com/office/drawing/2010/main" val="0"/>
-              </a:ext>
-            </a:extLst>
-          </a:blip>
-          <a:srcRect/>
-          <a:stretch>
-            <a:fillRect/>
-          </a:stretch>
-        </p:blipFill>
-        <p:spPr bwMode="auto">
-          <a:xfrm>
-            <a:off x="6084168" y="4725144"/>
-            <a:ext cx="2752725" cy="1666875"/>
-          </a:xfrm>
-          <a:prstGeom prst="rect">
-            <a:avLst/>
-          </a:prstGeom>
-          <a:noFill/>
-          <a:extLst>
-            <a:ext uri="{909E8E84-426E-40dd-AFC4-6F175D3DCCD1}">
-              <a14:hiddenFill xmlns:a14="http://schemas.microsoft.com/office/drawing/2010/main">
-                <a:solidFill>
-                  <a:srgbClr val="FFFFFF"/>
-                </a:solidFill>
-              </a14:hiddenFill>
-            </a:ext>
-          </a:extLst>
-        </p:spPr>
-      </p:pic>
       <p:pic>
         <p:nvPicPr>
           <p:cNvPr id="7" name="Picture 2"/>
@@ -6314,7 +6207,7 @@
           <p:nvPr/>
         </p:nvPicPr>
         <p:blipFill>
-          <a:blip r:embed="rId3">
+          <a:blip r:embed="rId2">
             <a:extLst>
               <a:ext uri="{28A0092B-C50C-407E-A947-70E740481C1C}">
                 <a14:useLocalDpi xmlns:a14="http://schemas.microsoft.com/office/drawing/2010/main" val="0"/>

</xml_diff>